<commit_message>
small change font size
</commit_message>
<xml_diff>
--- a/Lessons/Jaar 2/Lesson 2/Lesson 2.pptx
+++ b/Lessons/Jaar 2/Lesson 2/Lesson 2.pptx
@@ -214,7 +214,7 @@
           <a:p>
             <a:fld id="{D551BD75-BCF3-4C3D-A7C2-9A6CA9C18BF5}" type="datetimeFigureOut">
               <a:rPr lang="en-US" smtClean="0"/>
-              <a:t>12/3/2019</a:t>
+              <a:t>12/4/2019</a:t>
             </a:fld>
             <a:endParaRPr lang="en-US"/>
           </a:p>
@@ -822,7 +822,7 @@
           <a:p>
             <a:fld id="{84F85FDE-986E-4551-989E-09F8C4D6AE8F}" type="datetimeFigureOut">
               <a:rPr lang="en-US" smtClean="0"/>
-              <a:t>12/3/2019</a:t>
+              <a:t>12/4/2019</a:t>
             </a:fld>
             <a:endParaRPr lang="en-US"/>
           </a:p>
@@ -1022,7 +1022,7 @@
           <a:p>
             <a:fld id="{84F85FDE-986E-4551-989E-09F8C4D6AE8F}" type="datetimeFigureOut">
               <a:rPr lang="en-US" smtClean="0"/>
-              <a:t>12/3/2019</a:t>
+              <a:t>12/4/2019</a:t>
             </a:fld>
             <a:endParaRPr lang="en-US"/>
           </a:p>
@@ -1232,7 +1232,7 @@
           <a:p>
             <a:fld id="{84F85FDE-986E-4551-989E-09F8C4D6AE8F}" type="datetimeFigureOut">
               <a:rPr lang="en-US" smtClean="0"/>
-              <a:t>12/3/2019</a:t>
+              <a:t>12/4/2019</a:t>
             </a:fld>
             <a:endParaRPr lang="en-US"/>
           </a:p>
@@ -1594,7 +1594,7 @@
           <a:p>
             <a:fld id="{84F85FDE-986E-4551-989E-09F8C4D6AE8F}" type="datetimeFigureOut">
               <a:rPr lang="en-US" smtClean="0"/>
-              <a:t>12/3/2019</a:t>
+              <a:t>12/4/2019</a:t>
             </a:fld>
             <a:endParaRPr lang="en-US"/>
           </a:p>
@@ -1870,7 +1870,7 @@
           <a:p>
             <a:fld id="{84F85FDE-986E-4551-989E-09F8C4D6AE8F}" type="datetimeFigureOut">
               <a:rPr lang="en-US" smtClean="0"/>
-              <a:t>12/3/2019</a:t>
+              <a:t>12/4/2019</a:t>
             </a:fld>
             <a:endParaRPr lang="en-US"/>
           </a:p>
@@ -2138,7 +2138,7 @@
           <a:p>
             <a:fld id="{84F85FDE-986E-4551-989E-09F8C4D6AE8F}" type="datetimeFigureOut">
               <a:rPr lang="en-US" smtClean="0"/>
-              <a:t>12/3/2019</a:t>
+              <a:t>12/4/2019</a:t>
             </a:fld>
             <a:endParaRPr lang="en-US"/>
           </a:p>
@@ -2553,7 +2553,7 @@
           <a:p>
             <a:fld id="{84F85FDE-986E-4551-989E-09F8C4D6AE8F}" type="datetimeFigureOut">
               <a:rPr lang="en-US" smtClean="0"/>
-              <a:t>12/3/2019</a:t>
+              <a:t>12/4/2019</a:t>
             </a:fld>
             <a:endParaRPr lang="en-US"/>
           </a:p>
@@ -2695,7 +2695,7 @@
           <a:p>
             <a:fld id="{84F85FDE-986E-4551-989E-09F8C4D6AE8F}" type="datetimeFigureOut">
               <a:rPr lang="en-US" smtClean="0"/>
-              <a:t>12/3/2019</a:t>
+              <a:t>12/4/2019</a:t>
             </a:fld>
             <a:endParaRPr lang="en-US"/>
           </a:p>
@@ -2808,7 +2808,7 @@
           <a:p>
             <a:fld id="{84F85FDE-986E-4551-989E-09F8C4D6AE8F}" type="datetimeFigureOut">
               <a:rPr lang="en-US" smtClean="0"/>
-              <a:t>12/3/2019</a:t>
+              <a:t>12/4/2019</a:t>
             </a:fld>
             <a:endParaRPr lang="en-US"/>
           </a:p>
@@ -3121,7 +3121,7 @@
           <a:p>
             <a:fld id="{84F85FDE-986E-4551-989E-09F8C4D6AE8F}" type="datetimeFigureOut">
               <a:rPr lang="en-US" smtClean="0"/>
-              <a:t>12/3/2019</a:t>
+              <a:t>12/4/2019</a:t>
             </a:fld>
             <a:endParaRPr lang="en-US"/>
           </a:p>
@@ -3410,7 +3410,7 @@
           <a:p>
             <a:fld id="{84F85FDE-986E-4551-989E-09F8C4D6AE8F}" type="datetimeFigureOut">
               <a:rPr lang="en-US" smtClean="0"/>
-              <a:t>12/3/2019</a:t>
+              <a:t>12/4/2019</a:t>
             </a:fld>
             <a:endParaRPr lang="en-US"/>
           </a:p>
@@ -3653,7 +3653,7 @@
           <a:p>
             <a:fld id="{84F85FDE-986E-4551-989E-09F8C4D6AE8F}" type="datetimeFigureOut">
               <a:rPr lang="en-US" smtClean="0"/>
-              <a:t>12/3/2019</a:t>
+              <a:t>12/4/2019</a:t>
             </a:fld>
             <a:endParaRPr lang="en-US"/>
           </a:p>
@@ -5284,7 +5284,7 @@
         <p:spPr>
           <a:xfrm>
             <a:off x="994298" y="2095130"/>
-            <a:ext cx="7741329" cy="2031325"/>
+            <a:ext cx="7741329" cy="3108543"/>
           </a:xfrm>
           <a:prstGeom prst="rect">
             <a:avLst/>
@@ -5302,7 +5302,7 @@
               <a:buChar char="•"/>
             </a:pPr>
             <a:r>
-              <a:rPr lang="en-US" dirty="0"/>
+              <a:rPr lang="en-US" sz="2800" dirty="0"/>
               <a:t>Create a class with methods</a:t>
             </a:r>
           </a:p>
@@ -5312,7 +5312,7 @@
               <a:buChar char="•"/>
             </a:pPr>
             <a:r>
-              <a:rPr lang="en-US" dirty="0"/>
+              <a:rPr lang="en-US" sz="2800" dirty="0"/>
               <a:t>A method to go from Celsius to Fahrenheit</a:t>
             </a:r>
           </a:p>
@@ -5322,7 +5322,7 @@
               <a:buChar char="•"/>
             </a:pPr>
             <a:r>
-              <a:rPr lang="en-US" dirty="0"/>
+              <a:rPr lang="en-US" sz="2800" dirty="0"/>
               <a:t>A method to go from Celsius to Kelvin</a:t>
             </a:r>
           </a:p>
@@ -5332,7 +5332,7 @@
               <a:buChar char="•"/>
             </a:pPr>
             <a:r>
-              <a:rPr lang="en-US" dirty="0"/>
+              <a:rPr lang="en-US" sz="2800" dirty="0"/>
               <a:t>A method to go from Fahrenheit to Celsius</a:t>
             </a:r>
           </a:p>
@@ -5342,7 +5342,7 @@
               <a:buChar char="•"/>
             </a:pPr>
             <a:r>
-              <a:rPr lang="en-US" dirty="0"/>
+              <a:rPr lang="en-US" sz="2800" dirty="0"/>
               <a:t>A method to go from Fahrenheit to Kelvin</a:t>
             </a:r>
           </a:p>
@@ -5352,7 +5352,7 @@
               <a:buChar char="•"/>
             </a:pPr>
             <a:r>
-              <a:rPr lang="en-US" dirty="0"/>
+              <a:rPr lang="en-US" sz="2800" dirty="0"/>
               <a:t>A method to go from Kelvin to Celsius</a:t>
             </a:r>
           </a:p>
@@ -5362,7 +5362,7 @@
               <a:buChar char="•"/>
             </a:pPr>
             <a:r>
-              <a:rPr lang="en-US" dirty="0"/>
+              <a:rPr lang="en-US" sz="2800" dirty="0"/>
               <a:t>A method to go from Kelvin to Fahrenheit</a:t>
             </a:r>
           </a:p>

</xml_diff>